<commit_message>
Add exception filters and global handling examples
Added slides and code for global handling, logging, etc.
</commit_message>
<xml_diff>
--- a/Slides/Module 4 - Validation and Error Handling.pptx
+++ b/Slides/Module 4 - Validation and Error Handling.pptx
@@ -5,10 +5,10 @@
     <p:sldMasterId id="2147483660" r:id="rId4"/>
   </p:sldMasterIdLst>
   <p:notesMasterIdLst>
-    <p:notesMasterId r:id="rId19"/>
+    <p:notesMasterId r:id="rId25"/>
   </p:notesMasterIdLst>
   <p:handoutMasterIdLst>
-    <p:handoutMasterId r:id="rId20"/>
+    <p:handoutMasterId r:id="rId26"/>
   </p:handoutMasterIdLst>
   <p:sldIdLst>
     <p:sldId id="277" r:id="rId5"/>
@@ -23,8 +23,14 @@
     <p:sldId id="308" r:id="rId14"/>
     <p:sldId id="309" r:id="rId15"/>
     <p:sldId id="300" r:id="rId16"/>
-    <p:sldId id="304" r:id="rId17"/>
-    <p:sldId id="269" r:id="rId18"/>
+    <p:sldId id="310" r:id="rId17"/>
+    <p:sldId id="311" r:id="rId18"/>
+    <p:sldId id="304" r:id="rId19"/>
+    <p:sldId id="312" r:id="rId20"/>
+    <p:sldId id="313" r:id="rId21"/>
+    <p:sldId id="314" r:id="rId22"/>
+    <p:sldId id="315" r:id="rId23"/>
+    <p:sldId id="269" r:id="rId24"/>
   </p:sldIdLst>
   <p:sldSz cx="12192000" cy="6858000"/>
   <p:notesSz cx="6858000" cy="9144000"/>
@@ -216,7 +222,7 @@
           <a:p>
             <a:fld id="{312E7B4A-039C-48A2-9B2C-AF16AA3873D8}" type="datetimeFigureOut">
               <a:rPr lang="en-US" smtClean="0"/>
-              <a:t>1/8/2015</a:t>
+              <a:t>1/15/2015</a:t>
             </a:fld>
             <a:endParaRPr lang="en-US"/>
           </a:p>
@@ -381,7 +387,7 @@
           <a:p>
             <a:fld id="{DA005A0C-54D9-45AA-87D4-C551D08DFCE1}" type="datetimeFigureOut">
               <a:rPr lang="en-US" smtClean="0"/>
-              <a:t>1/8/2015</a:t>
+              <a:t>1/15/2015</a:t>
             </a:fld>
             <a:endParaRPr lang="en-US"/>
           </a:p>
@@ -998,6 +1004,182 @@
     <p:extLst>
       <p:ext uri="{BB962C8B-B14F-4D97-AF65-F5344CB8AC3E}">
         <p14:creationId xmlns:p14="http://schemas.microsoft.com/office/powerpoint/2010/main" val="3649459500"/>
+      </p:ext>
+    </p:extLst>
+  </p:cSld>
+  <p:clrMapOvr>
+    <a:masterClrMapping/>
+  </p:clrMapOvr>
+</p:notes>
+</file>
+
+<file path=ppt/notesSlides/notesSlide5.xml><?xml version="1.0" encoding="utf-8"?>
+<p:notes xmlns:a="http://schemas.openxmlformats.org/drawingml/2006/main" xmlns:r="http://schemas.openxmlformats.org/officeDocument/2006/relationships" xmlns:p="http://schemas.openxmlformats.org/presentationml/2006/main">
+  <p:cSld>
+    <p:spTree>
+      <p:nvGrpSpPr>
+        <p:cNvPr id="1" name=""/>
+        <p:cNvGrpSpPr/>
+        <p:nvPr/>
+      </p:nvGrpSpPr>
+      <p:grpSpPr>
+        <a:xfrm>
+          <a:off x="0" y="0"/>
+          <a:ext cx="0" cy="0"/>
+          <a:chOff x="0" y="0"/>
+          <a:chExt cx="0" cy="0"/>
+        </a:xfrm>
+      </p:grpSpPr>
+      <p:sp>
+        <p:nvSpPr>
+          <p:cNvPr id="2" name="Slide Image Placeholder 1"/>
+          <p:cNvSpPr>
+            <a:spLocks noGrp="1" noRot="1" noChangeAspect="1"/>
+          </p:cNvSpPr>
+          <p:nvPr>
+            <p:ph type="sldImg"/>
+          </p:nvPr>
+        </p:nvSpPr>
+        <p:spPr/>
+      </p:sp>
+      <p:sp>
+        <p:nvSpPr>
+          <p:cNvPr id="3" name="Notes Placeholder 2"/>
+          <p:cNvSpPr>
+            <a:spLocks noGrp="1"/>
+          </p:cNvSpPr>
+          <p:nvPr>
+            <p:ph type="body" idx="1"/>
+          </p:nvPr>
+        </p:nvSpPr>
+        <p:spPr/>
+        <p:txBody>
+          <a:bodyPr/>
+          <a:lstStyle/>
+          <a:p>
+            <a:r>
+              <a:rPr lang="en-US" smtClean="0"/>
+              <a:t>04aModelValidation</a:t>
+            </a:r>
+            <a:endParaRPr lang="en-US"/>
+          </a:p>
+        </p:txBody>
+      </p:sp>
+      <p:sp>
+        <p:nvSpPr>
+          <p:cNvPr id="4" name="Slide Number Placeholder 3"/>
+          <p:cNvSpPr>
+            <a:spLocks noGrp="1"/>
+          </p:cNvSpPr>
+          <p:nvPr>
+            <p:ph type="sldNum" sz="quarter" idx="10"/>
+          </p:nvPr>
+        </p:nvSpPr>
+        <p:spPr/>
+        <p:txBody>
+          <a:bodyPr/>
+          <a:lstStyle/>
+          <a:p>
+            <a:fld id="{4CFD207A-07DF-40AD-A916-9872E089CE7A}" type="slidenum">
+              <a:rPr lang="en-US" smtClean="0"/>
+              <a:t>14</a:t>
+            </a:fld>
+            <a:endParaRPr lang="en-US"/>
+          </a:p>
+        </p:txBody>
+      </p:sp>
+    </p:spTree>
+    <p:extLst>
+      <p:ext uri="{BB962C8B-B14F-4D97-AF65-F5344CB8AC3E}">
+        <p14:creationId xmlns:p14="http://schemas.microsoft.com/office/powerpoint/2010/main" val="1589695000"/>
+      </p:ext>
+    </p:extLst>
+  </p:cSld>
+  <p:clrMapOvr>
+    <a:masterClrMapping/>
+  </p:clrMapOvr>
+</p:notes>
+</file>
+
+<file path=ppt/notesSlides/notesSlide6.xml><?xml version="1.0" encoding="utf-8"?>
+<p:notes xmlns:a="http://schemas.openxmlformats.org/drawingml/2006/main" xmlns:r="http://schemas.openxmlformats.org/officeDocument/2006/relationships" xmlns:p="http://schemas.openxmlformats.org/presentationml/2006/main">
+  <p:cSld>
+    <p:spTree>
+      <p:nvGrpSpPr>
+        <p:cNvPr id="1" name=""/>
+        <p:cNvGrpSpPr/>
+        <p:nvPr/>
+      </p:nvGrpSpPr>
+      <p:grpSpPr>
+        <a:xfrm>
+          <a:off x="0" y="0"/>
+          <a:ext cx="0" cy="0"/>
+          <a:chOff x="0" y="0"/>
+          <a:chExt cx="0" cy="0"/>
+        </a:xfrm>
+      </p:grpSpPr>
+      <p:sp>
+        <p:nvSpPr>
+          <p:cNvPr id="2" name="Slide Image Placeholder 1"/>
+          <p:cNvSpPr>
+            <a:spLocks noGrp="1" noRot="1" noChangeAspect="1"/>
+          </p:cNvSpPr>
+          <p:nvPr>
+            <p:ph type="sldImg"/>
+          </p:nvPr>
+        </p:nvSpPr>
+        <p:spPr/>
+      </p:sp>
+      <p:sp>
+        <p:nvSpPr>
+          <p:cNvPr id="3" name="Notes Placeholder 2"/>
+          <p:cNvSpPr>
+            <a:spLocks noGrp="1"/>
+          </p:cNvSpPr>
+          <p:nvPr>
+            <p:ph type="body" idx="1"/>
+          </p:nvPr>
+        </p:nvSpPr>
+        <p:spPr/>
+        <p:txBody>
+          <a:bodyPr/>
+          <a:lstStyle/>
+          <a:p>
+            <a:r>
+              <a:rPr lang="en-US" smtClean="0"/>
+              <a:t>04aModelValidation</a:t>
+            </a:r>
+            <a:endParaRPr lang="en-US"/>
+          </a:p>
+        </p:txBody>
+      </p:sp>
+      <p:sp>
+        <p:nvSpPr>
+          <p:cNvPr id="4" name="Slide Number Placeholder 3"/>
+          <p:cNvSpPr>
+            <a:spLocks noGrp="1"/>
+          </p:cNvSpPr>
+          <p:nvPr>
+            <p:ph type="sldNum" sz="quarter" idx="10"/>
+          </p:nvPr>
+        </p:nvSpPr>
+        <p:spPr/>
+        <p:txBody>
+          <a:bodyPr/>
+          <a:lstStyle/>
+          <a:p>
+            <a:fld id="{4CFD207A-07DF-40AD-A916-9872E089CE7A}" type="slidenum">
+              <a:rPr lang="en-US" smtClean="0"/>
+              <a:t>19</a:t>
+            </a:fld>
+            <a:endParaRPr lang="en-US"/>
+          </a:p>
+        </p:txBody>
+      </p:sp>
+    </p:spTree>
+    <p:extLst>
+      <p:ext uri="{BB962C8B-B14F-4D97-AF65-F5344CB8AC3E}">
+        <p14:creationId xmlns:p14="http://schemas.microsoft.com/office/powerpoint/2010/main" val="897055751"/>
       </p:ext>
     </p:extLst>
   </p:cSld>
@@ -4153,12 +4335,12 @@
       </p:grpSpPr>
       <p:sp>
         <p:nvSpPr>
-          <p:cNvPr id="5" name="Text Placeholder 4"/>
-          <p:cNvSpPr>
-            <a:spLocks noGrp="1"/>
-          </p:cNvSpPr>
-          <p:nvPr>
-            <p:ph type="body" sz="quarter" idx="10"/>
+          <p:cNvPr id="2" name="Title 1"/>
+          <p:cNvSpPr>
+            <a:spLocks noGrp="1"/>
+          </p:cNvSpPr>
+          <p:nvPr>
+            <p:ph type="title"/>
           </p:nvPr>
         </p:nvSpPr>
         <p:spPr/>
@@ -4168,7 +4350,7 @@
           <a:p>
             <a:r>
               <a:rPr lang="en-US" dirty="0" smtClean="0"/>
-              <a:t>Global Exception Handling</a:t>
+              <a:t>Exception Filters</a:t>
             </a:r>
             <a:endParaRPr lang="en-US" dirty="0"/>
           </a:p>
@@ -4176,12 +4358,12 @@
       </p:sp>
       <p:sp>
         <p:nvSpPr>
-          <p:cNvPr id="4" name="Subtitle 3"/>
-          <p:cNvSpPr>
-            <a:spLocks noGrp="1"/>
-          </p:cNvSpPr>
-          <p:nvPr>
-            <p:ph type="subTitle" idx="1"/>
+          <p:cNvPr id="3" name="Content Placeholder 2"/>
+          <p:cNvSpPr>
+            <a:spLocks noGrp="1"/>
+          </p:cNvSpPr>
+          <p:nvPr>
+            <p:ph sz="quarter" idx="10"/>
           </p:nvPr>
         </p:nvSpPr>
         <p:spPr/>
@@ -4191,16 +4373,73 @@
           <a:p>
             <a:r>
               <a:rPr lang="en-US" dirty="0" smtClean="0"/>
-              <a:t>A strategy we can all agree on</a:t>
-            </a:r>
-            <a:endParaRPr lang="en-US" dirty="0"/>
+              <a:t>Reusable </a:t>
+            </a:r>
+          </a:p>
+          <a:p>
+            <a:r>
+              <a:rPr lang="en-US" dirty="0" smtClean="0"/>
+              <a:t>Can apply at action, controller, or global level</a:t>
+            </a:r>
+          </a:p>
+          <a:p>
+            <a:r>
+              <a:rPr lang="en-US" dirty="0" smtClean="0"/>
+              <a:t>Less access to context/content</a:t>
+            </a:r>
+          </a:p>
+          <a:p>
+            <a:r>
+              <a:rPr lang="en-US" dirty="0" smtClean="0"/>
+              <a:t>Exception is still thrown in debug </a:t>
+            </a:r>
+          </a:p>
+          <a:p>
+            <a:r>
+              <a:rPr lang="en-US" dirty="0" smtClean="0"/>
+              <a:t>Derive from </a:t>
+            </a:r>
+            <a:r>
+              <a:rPr lang="en-US" dirty="0" err="1" smtClean="0"/>
+              <a:t>ExceptionFilterAttribute</a:t>
+            </a:r>
+            <a:r>
+              <a:rPr lang="en-US" dirty="0" smtClean="0"/>
+              <a:t>, then</a:t>
+            </a:r>
+          </a:p>
+          <a:p>
+            <a:r>
+              <a:rPr lang="en-US" dirty="0" smtClean="0"/>
+              <a:t>Override </a:t>
+            </a:r>
+            <a:r>
+              <a:rPr lang="en-US" dirty="0" err="1" smtClean="0"/>
+              <a:t>OnException</a:t>
+            </a:r>
+            <a:r>
+              <a:rPr lang="en-US" dirty="0" smtClean="0"/>
+              <a:t> </a:t>
+            </a:r>
+          </a:p>
+          <a:p>
+            <a:r>
+              <a:rPr lang="en-US" dirty="0" smtClean="0"/>
+              <a:t>Set the Response to something new if you want to</a:t>
+            </a:r>
+          </a:p>
+          <a:p>
+            <a:endParaRPr lang="en-US" dirty="0" smtClean="0"/>
+          </a:p>
+          <a:p>
+            <a:endParaRPr lang="en-US" dirty="0" smtClean="0"/>
           </a:p>
         </p:txBody>
       </p:sp>
     </p:spTree>
     <p:extLst>
       <p:ext uri="{BB962C8B-B14F-4D97-AF65-F5344CB8AC3E}">
-        <p14:creationId xmlns:p14="http://schemas.microsoft.com/office/powerpoint/2010/main" val="3698693145"/>
+        <p14:creationId xmlns:p14="http://schemas.microsoft.com/office/powerpoint/2010/main" val="1945316093"/>
       </p:ext>
     </p:extLst>
   </p:cSld>
@@ -4234,10 +4473,563 @@
           <a:chExt cx="0" cy="0"/>
         </a:xfrm>
       </p:grpSpPr>
+      <p:sp>
+        <p:nvSpPr>
+          <p:cNvPr id="4" name="Title 3"/>
+          <p:cNvSpPr>
+            <a:spLocks noGrp="1"/>
+          </p:cNvSpPr>
+          <p:nvPr>
+            <p:ph type="title"/>
+          </p:nvPr>
+        </p:nvSpPr>
+        <p:spPr/>
+        <p:txBody>
+          <a:bodyPr>
+            <a:normAutofit/>
+          </a:bodyPr>
+          <a:lstStyle/>
+          <a:p>
+            <a:r>
+              <a:rPr lang="en-US" b="1" dirty="0" smtClean="0"/>
+              <a:t>Exception Filters</a:t>
+            </a:r>
+            <a:endParaRPr lang="en-US" b="1" dirty="0"/>
+          </a:p>
+        </p:txBody>
+      </p:sp>
     </p:spTree>
     <p:extLst>
       <p:ext uri="{BB962C8B-B14F-4D97-AF65-F5344CB8AC3E}">
-        <p14:creationId xmlns:p14="http://schemas.microsoft.com/office/powerpoint/2010/main" val="898363405"/>
+        <p14:creationId xmlns:p14="http://schemas.microsoft.com/office/powerpoint/2010/main" val="2995816797"/>
+      </p:ext>
+    </p:extLst>
+  </p:cSld>
+  <p:clrMapOvr>
+    <a:masterClrMapping/>
+  </p:clrMapOvr>
+  <p:timing>
+    <p:tnLst>
+      <p:par>
+        <p:cTn id="1" dur="indefinite" restart="never" nodeType="tmRoot"/>
+      </p:par>
+    </p:tnLst>
+  </p:timing>
+</p:sld>
+</file>
+
+<file path=ppt/slides/slide15.xml><?xml version="1.0" encoding="utf-8"?>
+<p:sld xmlns:a="http://schemas.openxmlformats.org/drawingml/2006/main" xmlns:r="http://schemas.openxmlformats.org/officeDocument/2006/relationships" xmlns:p="http://schemas.openxmlformats.org/presentationml/2006/main">
+  <p:cSld>
+    <p:spTree>
+      <p:nvGrpSpPr>
+        <p:cNvPr id="1" name=""/>
+        <p:cNvGrpSpPr/>
+        <p:nvPr/>
+      </p:nvGrpSpPr>
+      <p:grpSpPr>
+        <a:xfrm>
+          <a:off x="0" y="0"/>
+          <a:ext cx="0" cy="0"/>
+          <a:chOff x="0" y="0"/>
+          <a:chExt cx="0" cy="0"/>
+        </a:xfrm>
+      </p:grpSpPr>
+      <p:sp>
+        <p:nvSpPr>
+          <p:cNvPr id="5" name="Text Placeholder 4"/>
+          <p:cNvSpPr>
+            <a:spLocks noGrp="1"/>
+          </p:cNvSpPr>
+          <p:nvPr>
+            <p:ph type="body" sz="quarter" idx="10"/>
+          </p:nvPr>
+        </p:nvSpPr>
+        <p:spPr/>
+        <p:txBody>
+          <a:bodyPr/>
+          <a:lstStyle/>
+          <a:p>
+            <a:r>
+              <a:rPr lang="en-US" dirty="0" smtClean="0"/>
+              <a:t>Global Exception Handling</a:t>
+            </a:r>
+            <a:endParaRPr lang="en-US" dirty="0"/>
+          </a:p>
+        </p:txBody>
+      </p:sp>
+      <p:sp>
+        <p:nvSpPr>
+          <p:cNvPr id="4" name="Subtitle 3"/>
+          <p:cNvSpPr>
+            <a:spLocks noGrp="1"/>
+          </p:cNvSpPr>
+          <p:nvPr>
+            <p:ph type="subTitle" idx="1"/>
+          </p:nvPr>
+        </p:nvSpPr>
+        <p:spPr/>
+        <p:txBody>
+          <a:bodyPr/>
+          <a:lstStyle/>
+          <a:p>
+            <a:r>
+              <a:rPr lang="en-US" dirty="0" smtClean="0"/>
+              <a:t>A strategy we can all agree on</a:t>
+            </a:r>
+            <a:endParaRPr lang="en-US" dirty="0"/>
+          </a:p>
+        </p:txBody>
+      </p:sp>
+    </p:spTree>
+    <p:extLst>
+      <p:ext uri="{BB962C8B-B14F-4D97-AF65-F5344CB8AC3E}">
+        <p14:creationId xmlns:p14="http://schemas.microsoft.com/office/powerpoint/2010/main" val="3698693145"/>
+      </p:ext>
+    </p:extLst>
+  </p:cSld>
+  <p:clrMapOvr>
+    <a:masterClrMapping/>
+  </p:clrMapOvr>
+  <p:timing>
+    <p:tnLst>
+      <p:par>
+        <p:cTn id="1" dur="indefinite" restart="never" nodeType="tmRoot"/>
+      </p:par>
+    </p:tnLst>
+  </p:timing>
+</p:sld>
+</file>
+
+<file path=ppt/slides/slide16.xml><?xml version="1.0" encoding="utf-8"?>
+<p:sld xmlns:a="http://schemas.openxmlformats.org/drawingml/2006/main" xmlns:r="http://schemas.openxmlformats.org/officeDocument/2006/relationships" xmlns:p="http://schemas.openxmlformats.org/presentationml/2006/main">
+  <p:cSld>
+    <p:spTree>
+      <p:nvGrpSpPr>
+        <p:cNvPr id="1" name=""/>
+        <p:cNvGrpSpPr/>
+        <p:nvPr/>
+      </p:nvGrpSpPr>
+      <p:grpSpPr>
+        <a:xfrm>
+          <a:off x="0" y="0"/>
+          <a:ext cx="0" cy="0"/>
+          <a:chOff x="0" y="0"/>
+          <a:chExt cx="0" cy="0"/>
+        </a:xfrm>
+      </p:grpSpPr>
+      <p:sp>
+        <p:nvSpPr>
+          <p:cNvPr id="2" name="Title 1"/>
+          <p:cNvSpPr>
+            <a:spLocks noGrp="1"/>
+          </p:cNvSpPr>
+          <p:nvPr>
+            <p:ph type="title"/>
+          </p:nvPr>
+        </p:nvSpPr>
+        <p:spPr/>
+        <p:txBody>
+          <a:bodyPr/>
+          <a:lstStyle/>
+          <a:p>
+            <a:r>
+              <a:rPr lang="en-US" dirty="0" smtClean="0"/>
+              <a:t>Global Exception Handling</a:t>
+            </a:r>
+            <a:endParaRPr lang="en-US" dirty="0"/>
+          </a:p>
+        </p:txBody>
+      </p:sp>
+      <p:sp>
+        <p:nvSpPr>
+          <p:cNvPr id="3" name="Content Placeholder 2"/>
+          <p:cNvSpPr>
+            <a:spLocks noGrp="1"/>
+          </p:cNvSpPr>
+          <p:nvPr>
+            <p:ph sz="quarter" idx="10"/>
+          </p:nvPr>
+        </p:nvSpPr>
+        <p:spPr/>
+        <p:txBody>
+          <a:bodyPr/>
+          <a:lstStyle/>
+          <a:p>
+            <a:r>
+              <a:rPr lang="en-US" dirty="0" smtClean="0"/>
+              <a:t>Tricky areas for errors:</a:t>
+            </a:r>
+          </a:p>
+          <a:p>
+            <a:pPr lvl="1"/>
+            <a:r>
+              <a:rPr lang="en-US" dirty="0" smtClean="0"/>
+              <a:t>Controller constructors</a:t>
+            </a:r>
+          </a:p>
+          <a:p>
+            <a:pPr lvl="1"/>
+            <a:r>
+              <a:rPr lang="en-US" dirty="0" smtClean="0"/>
+              <a:t>Message handlers</a:t>
+            </a:r>
+          </a:p>
+          <a:p>
+            <a:pPr lvl="1"/>
+            <a:r>
+              <a:rPr lang="en-US" dirty="0" smtClean="0"/>
+              <a:t>Routing</a:t>
+            </a:r>
+          </a:p>
+          <a:p>
+            <a:pPr lvl="1"/>
+            <a:r>
+              <a:rPr lang="en-US" dirty="0" smtClean="0"/>
+              <a:t>Serialization</a:t>
+            </a:r>
+          </a:p>
+          <a:p>
+            <a:r>
+              <a:rPr lang="en-US" dirty="0" smtClean="0"/>
+              <a:t>Often lacks any “context” for error due to location</a:t>
+            </a:r>
+          </a:p>
+          <a:p>
+            <a:r>
+              <a:rPr lang="en-US" dirty="0" smtClean="0"/>
+              <a:t>There is a solution!</a:t>
+            </a:r>
+          </a:p>
+          <a:p>
+            <a:endParaRPr lang="en-US" dirty="0" smtClean="0"/>
+          </a:p>
+          <a:p>
+            <a:endParaRPr lang="en-US" dirty="0" smtClean="0"/>
+          </a:p>
+        </p:txBody>
+      </p:sp>
+    </p:spTree>
+    <p:extLst>
+      <p:ext uri="{BB962C8B-B14F-4D97-AF65-F5344CB8AC3E}">
+        <p14:creationId xmlns:p14="http://schemas.microsoft.com/office/powerpoint/2010/main" val="252034053"/>
+      </p:ext>
+    </p:extLst>
+  </p:cSld>
+  <p:clrMapOvr>
+    <a:masterClrMapping/>
+  </p:clrMapOvr>
+  <p:timing>
+    <p:tnLst>
+      <p:par>
+        <p:cTn id="1" dur="indefinite" restart="never" nodeType="tmRoot"/>
+      </p:par>
+    </p:tnLst>
+  </p:timing>
+</p:sld>
+</file>
+
+<file path=ppt/slides/slide17.xml><?xml version="1.0" encoding="utf-8"?>
+<p:sld xmlns:a="http://schemas.openxmlformats.org/drawingml/2006/main" xmlns:r="http://schemas.openxmlformats.org/officeDocument/2006/relationships" xmlns:p="http://schemas.openxmlformats.org/presentationml/2006/main">
+  <p:cSld>
+    <p:spTree>
+      <p:nvGrpSpPr>
+        <p:cNvPr id="1" name=""/>
+        <p:cNvGrpSpPr/>
+        <p:nvPr/>
+      </p:nvGrpSpPr>
+      <p:grpSpPr>
+        <a:xfrm>
+          <a:off x="0" y="0"/>
+          <a:ext cx="0" cy="0"/>
+          <a:chOff x="0" y="0"/>
+          <a:chExt cx="0" cy="0"/>
+        </a:xfrm>
+      </p:grpSpPr>
+      <p:sp>
+        <p:nvSpPr>
+          <p:cNvPr id="2" name="Title 1"/>
+          <p:cNvSpPr>
+            <a:spLocks noGrp="1"/>
+          </p:cNvSpPr>
+          <p:nvPr>
+            <p:ph type="title"/>
+          </p:nvPr>
+        </p:nvSpPr>
+        <p:spPr/>
+        <p:txBody>
+          <a:bodyPr/>
+          <a:lstStyle/>
+          <a:p>
+            <a:r>
+              <a:rPr lang="en-US" dirty="0" smtClean="0"/>
+              <a:t>Global Exception Handling</a:t>
+            </a:r>
+            <a:endParaRPr lang="en-US" dirty="0"/>
+          </a:p>
+        </p:txBody>
+      </p:sp>
+      <p:sp>
+        <p:nvSpPr>
+          <p:cNvPr id="3" name="Content Placeholder 2"/>
+          <p:cNvSpPr>
+            <a:spLocks noGrp="1"/>
+          </p:cNvSpPr>
+          <p:nvPr>
+            <p:ph sz="quarter" idx="10"/>
+          </p:nvPr>
+        </p:nvSpPr>
+        <p:spPr/>
+        <p:txBody>
+          <a:bodyPr/>
+          <a:lstStyle/>
+          <a:p>
+            <a:pPr marL="514350" indent="-514350">
+              <a:buAutoNum type="arabicPeriod"/>
+            </a:pPr>
+            <a:r>
+              <a:rPr lang="en-US" dirty="0" smtClean="0"/>
+              <a:t>Derive from </a:t>
+            </a:r>
+            <a:r>
+              <a:rPr lang="en-US" dirty="0" err="1" smtClean="0"/>
+              <a:t>ExceptionLogger</a:t>
+            </a:r>
+            <a:endParaRPr lang="en-US" dirty="0" smtClean="0"/>
+          </a:p>
+          <a:p>
+            <a:pPr marL="514350" indent="-514350">
+              <a:buAutoNum type="arabicPeriod"/>
+            </a:pPr>
+            <a:r>
+              <a:rPr lang="en-US" dirty="0" smtClean="0"/>
+              <a:t>You can have many of these</a:t>
+            </a:r>
+            <a:endParaRPr lang="en-US" dirty="0" smtClean="0"/>
+          </a:p>
+          <a:p>
+            <a:pPr marL="0" indent="0">
+              <a:buNone/>
+            </a:pPr>
+            <a:endParaRPr lang="en-US" dirty="0" smtClean="0"/>
+          </a:p>
+        </p:txBody>
+      </p:sp>
+      <p:pic>
+        <p:nvPicPr>
+          <p:cNvPr id="5" name="Picture 4"/>
+          <p:cNvPicPr>
+            <a:picLocks noChangeAspect="1"/>
+          </p:cNvPicPr>
+          <p:nvPr/>
+        </p:nvPicPr>
+        <p:blipFill>
+          <a:blip r:embed="rId2"/>
+          <a:stretch>
+            <a:fillRect/>
+          </a:stretch>
+        </p:blipFill>
+        <p:spPr>
+          <a:xfrm>
+            <a:off x="379413" y="3079897"/>
+            <a:ext cx="10611494" cy="2059174"/>
+          </a:xfrm>
+          <a:prstGeom prst="rect">
+            <a:avLst/>
+          </a:prstGeom>
+        </p:spPr>
+      </p:pic>
+    </p:spTree>
+    <p:extLst>
+      <p:ext uri="{BB962C8B-B14F-4D97-AF65-F5344CB8AC3E}">
+        <p14:creationId xmlns:p14="http://schemas.microsoft.com/office/powerpoint/2010/main" val="1637161549"/>
+      </p:ext>
+    </p:extLst>
+  </p:cSld>
+  <p:clrMapOvr>
+    <a:masterClrMapping/>
+  </p:clrMapOvr>
+  <p:timing>
+    <p:tnLst>
+      <p:par>
+        <p:cTn id="1" dur="indefinite" restart="never" nodeType="tmRoot"/>
+      </p:par>
+    </p:tnLst>
+  </p:timing>
+</p:sld>
+</file>
+
+<file path=ppt/slides/slide18.xml><?xml version="1.0" encoding="utf-8"?>
+<p:sld xmlns:a="http://schemas.openxmlformats.org/drawingml/2006/main" xmlns:r="http://schemas.openxmlformats.org/officeDocument/2006/relationships" xmlns:p="http://schemas.openxmlformats.org/presentationml/2006/main">
+  <p:cSld>
+    <p:spTree>
+      <p:nvGrpSpPr>
+        <p:cNvPr id="1" name=""/>
+        <p:cNvGrpSpPr/>
+        <p:nvPr/>
+      </p:nvGrpSpPr>
+      <p:grpSpPr>
+        <a:xfrm>
+          <a:off x="0" y="0"/>
+          <a:ext cx="0" cy="0"/>
+          <a:chOff x="0" y="0"/>
+          <a:chExt cx="0" cy="0"/>
+        </a:xfrm>
+      </p:grpSpPr>
+      <p:sp>
+        <p:nvSpPr>
+          <p:cNvPr id="2" name="Title 1"/>
+          <p:cNvSpPr>
+            <a:spLocks noGrp="1"/>
+          </p:cNvSpPr>
+          <p:nvPr>
+            <p:ph type="title"/>
+          </p:nvPr>
+        </p:nvSpPr>
+        <p:spPr/>
+        <p:txBody>
+          <a:bodyPr/>
+          <a:lstStyle/>
+          <a:p>
+            <a:r>
+              <a:rPr lang="en-US" dirty="0" smtClean="0"/>
+              <a:t>Global Exception Handling</a:t>
+            </a:r>
+            <a:endParaRPr lang="en-US" dirty="0"/>
+          </a:p>
+        </p:txBody>
+      </p:sp>
+      <p:sp>
+        <p:nvSpPr>
+          <p:cNvPr id="3" name="Content Placeholder 2"/>
+          <p:cNvSpPr>
+            <a:spLocks noGrp="1"/>
+          </p:cNvSpPr>
+          <p:nvPr>
+            <p:ph sz="quarter" idx="10"/>
+          </p:nvPr>
+        </p:nvSpPr>
+        <p:spPr/>
+        <p:txBody>
+          <a:bodyPr/>
+          <a:lstStyle/>
+          <a:p>
+            <a:pPr marL="514350" indent="-514350">
+              <a:buAutoNum type="arabicPeriod"/>
+            </a:pPr>
+            <a:r>
+              <a:rPr lang="en-US" dirty="0" smtClean="0"/>
+              <a:t>Derive from Exception Handler</a:t>
+            </a:r>
+          </a:p>
+          <a:p>
+            <a:pPr marL="514350" indent="-514350">
+              <a:buAutoNum type="arabicPeriod"/>
+            </a:pPr>
+            <a:r>
+              <a:rPr lang="en-US" dirty="0" smtClean="0"/>
+              <a:t>“There can only be ONE!”</a:t>
+            </a:r>
+            <a:endParaRPr lang="en-US" dirty="0" smtClean="0"/>
+          </a:p>
+          <a:p>
+            <a:pPr marL="0" indent="0">
+              <a:buNone/>
+            </a:pPr>
+            <a:endParaRPr lang="en-US" dirty="0" smtClean="0"/>
+          </a:p>
+        </p:txBody>
+      </p:sp>
+      <p:pic>
+        <p:nvPicPr>
+          <p:cNvPr id="5" name="Picture 4"/>
+          <p:cNvPicPr>
+            <a:picLocks noChangeAspect="1"/>
+          </p:cNvPicPr>
+          <p:nvPr/>
+        </p:nvPicPr>
+        <p:blipFill>
+          <a:blip r:embed="rId2"/>
+          <a:stretch>
+            <a:fillRect/>
+          </a:stretch>
+        </p:blipFill>
+        <p:spPr>
+          <a:xfrm>
+            <a:off x="379413" y="3172047"/>
+            <a:ext cx="10667438" cy="2441944"/>
+          </a:xfrm>
+          <a:prstGeom prst="rect">
+            <a:avLst/>
+          </a:prstGeom>
+        </p:spPr>
+      </p:pic>
+    </p:spTree>
+    <p:extLst>
+      <p:ext uri="{BB962C8B-B14F-4D97-AF65-F5344CB8AC3E}">
+        <p14:creationId xmlns:p14="http://schemas.microsoft.com/office/powerpoint/2010/main" val="3655364836"/>
+      </p:ext>
+    </p:extLst>
+  </p:cSld>
+  <p:clrMapOvr>
+    <a:masterClrMapping/>
+  </p:clrMapOvr>
+  <p:timing>
+    <p:tnLst>
+      <p:par>
+        <p:cTn id="1" dur="indefinite" restart="never" nodeType="tmRoot"/>
+      </p:par>
+    </p:tnLst>
+  </p:timing>
+</p:sld>
+</file>
+
+<file path=ppt/slides/slide19.xml><?xml version="1.0" encoding="utf-8"?>
+<p:sld xmlns:a="http://schemas.openxmlformats.org/drawingml/2006/main" xmlns:r="http://schemas.openxmlformats.org/officeDocument/2006/relationships" xmlns:p="http://schemas.openxmlformats.org/presentationml/2006/main">
+  <p:cSld>
+    <p:spTree>
+      <p:nvGrpSpPr>
+        <p:cNvPr id="1" name=""/>
+        <p:cNvGrpSpPr/>
+        <p:nvPr/>
+      </p:nvGrpSpPr>
+      <p:grpSpPr>
+        <a:xfrm>
+          <a:off x="0" y="0"/>
+          <a:ext cx="0" cy="0"/>
+          <a:chOff x="0" y="0"/>
+          <a:chExt cx="0" cy="0"/>
+        </a:xfrm>
+      </p:grpSpPr>
+      <p:sp>
+        <p:nvSpPr>
+          <p:cNvPr id="4" name="Title 3"/>
+          <p:cNvSpPr>
+            <a:spLocks noGrp="1"/>
+          </p:cNvSpPr>
+          <p:nvPr>
+            <p:ph type="title"/>
+          </p:nvPr>
+        </p:nvSpPr>
+        <p:spPr/>
+        <p:txBody>
+          <a:bodyPr>
+            <a:normAutofit/>
+          </a:bodyPr>
+          <a:lstStyle/>
+          <a:p>
+            <a:r>
+              <a:rPr lang="en-US" b="1" dirty="0" smtClean="0"/>
+              <a:t>Global Exception Handling</a:t>
+            </a:r>
+            <a:endParaRPr lang="en-US" b="1" dirty="0"/>
+          </a:p>
+        </p:txBody>
+      </p:sp>
+    </p:spTree>
+    <p:extLst>
+      <p:ext uri="{BB962C8B-B14F-4D97-AF65-F5344CB8AC3E}">
+        <p14:creationId xmlns:p14="http://schemas.microsoft.com/office/powerpoint/2010/main" val="475719641"/>
       </p:ext>
     </p:extLst>
   </p:cSld>
@@ -4347,6 +5139,43 @@
     <p:extLst>
       <p:ext uri="{BB962C8B-B14F-4D97-AF65-F5344CB8AC3E}">
         <p14:creationId xmlns:p14="http://schemas.microsoft.com/office/powerpoint/2010/main" val="318349970"/>
+      </p:ext>
+    </p:extLst>
+  </p:cSld>
+  <p:clrMapOvr>
+    <a:masterClrMapping/>
+  </p:clrMapOvr>
+  <p:timing>
+    <p:tnLst>
+      <p:par>
+        <p:cTn id="1" dur="indefinite" restart="never" nodeType="tmRoot"/>
+      </p:par>
+    </p:tnLst>
+  </p:timing>
+</p:sld>
+</file>
+
+<file path=ppt/slides/slide20.xml><?xml version="1.0" encoding="utf-8"?>
+<p:sld xmlns:a="http://schemas.openxmlformats.org/drawingml/2006/main" xmlns:r="http://schemas.openxmlformats.org/officeDocument/2006/relationships" xmlns:p="http://schemas.openxmlformats.org/presentationml/2006/main">
+  <p:cSld>
+    <p:spTree>
+      <p:nvGrpSpPr>
+        <p:cNvPr id="1" name=""/>
+        <p:cNvGrpSpPr/>
+        <p:nvPr/>
+      </p:nvGrpSpPr>
+      <p:grpSpPr>
+        <a:xfrm>
+          <a:off x="0" y="0"/>
+          <a:ext cx="0" cy="0"/>
+          <a:chOff x="0" y="0"/>
+          <a:chExt cx="0" cy="0"/>
+        </a:xfrm>
+      </p:grpSpPr>
+    </p:spTree>
+    <p:extLst>
+      <p:ext uri="{BB962C8B-B14F-4D97-AF65-F5344CB8AC3E}">
+        <p14:creationId xmlns:p14="http://schemas.microsoft.com/office/powerpoint/2010/main" val="898363405"/>
       </p:ext>
     </p:extLst>
   </p:cSld>
@@ -4827,15 +5656,7 @@
           <a:p>
             <a:r>
               <a:rPr lang="en-US" dirty="0" smtClean="0"/>
-              <a:t>Data Annotations (con</a:t>
-            </a:r>
-            <a:r>
-              <a:rPr lang="en-US" dirty="0" smtClean="0"/>
-              <a:t>tinued</a:t>
-            </a:r>
-            <a:r>
-              <a:rPr lang="en-US" dirty="0" smtClean="0"/>
-              <a:t>)</a:t>
+              <a:t>Data Annotations (continued)</a:t>
             </a:r>
             <a:endParaRPr lang="en-US" dirty="0"/>
           </a:p>
@@ -4979,7 +5800,6 @@
               <a:rPr lang="en-US" b="1" dirty="0"/>
               <a:t>Model Validation</a:t>
             </a:r>
-            <a:endParaRPr lang="en-US" b="1" dirty="0"/>
           </a:p>
         </p:txBody>
       </p:sp>
@@ -5894,12 +6714,16 @@
 </file>
 
 <file path=customXml/item1.xml><?xml version="1.0" encoding="utf-8"?>
-<?mso-contentType ?>
-<FormTemplates xmlns="http://schemas.microsoft.com/sharepoint/v3/contenttype/forms">
-  <Display>DocumentLibraryForm</Display>
-  <Edit>DocumentLibraryForm</Edit>
-  <New>DocumentLibraryForm</New>
-</FormTemplates>
+<p:properties xmlns:p="http://schemas.microsoft.com/office/2006/metadata/properties" xmlns:xsi="http://www.w3.org/2001/XMLSchema-instance" xmlns:pc="http://schemas.microsoft.com/office/infopath/2007/PartnerControls">
+  <documentManagement>
+    <TaxCatchAll xmlns="230e9df3-be65-4c73-a93b-d1236ebd677e"/>
+    <PublishingExpirationDate xmlns="http://schemas.microsoft.com/sharepoint/v3" xsi:nil="true"/>
+    <PublishingStartDate xmlns="http://schemas.microsoft.com/sharepoint/v3" xsi:nil="true"/>
+    <TaxKeywordTaxHTField xmlns="230e9df3-be65-4c73-a93b-d1236ebd677e">
+      <Terms xmlns="http://schemas.microsoft.com/office/infopath/2007/PartnerControls"/>
+    </TaxKeywordTaxHTField>
+  </documentManagement>
+</p:properties>
 </file>
 
 <file path=customXml/item2.xml><?xml version="1.0" encoding="utf-8"?>
@@ -6085,22 +6909,28 @@
 </file>
 
 <file path=customXml/item3.xml><?xml version="1.0" encoding="utf-8"?>
-<p:properties xmlns:p="http://schemas.microsoft.com/office/2006/metadata/properties" xmlns:xsi="http://www.w3.org/2001/XMLSchema-instance" xmlns:pc="http://schemas.microsoft.com/office/infopath/2007/PartnerControls">
-  <documentManagement>
-    <TaxCatchAll xmlns="230e9df3-be65-4c73-a93b-d1236ebd677e"/>
-    <PublishingExpirationDate xmlns="http://schemas.microsoft.com/sharepoint/v3" xsi:nil="true"/>
-    <PublishingStartDate xmlns="http://schemas.microsoft.com/sharepoint/v3" xsi:nil="true"/>
-    <TaxKeywordTaxHTField xmlns="230e9df3-be65-4c73-a93b-d1236ebd677e">
-      <Terms xmlns="http://schemas.microsoft.com/office/infopath/2007/PartnerControls"/>
-    </TaxKeywordTaxHTField>
-  </documentManagement>
-</p:properties>
+<?mso-contentType ?>
+<FormTemplates xmlns="http://schemas.microsoft.com/sharepoint/v3/contenttype/forms">
+  <Display>DocumentLibraryForm</Display>
+  <Edit>DocumentLibraryForm</Edit>
+  <New>DocumentLibraryForm</New>
+</FormTemplates>
 </file>
 
 <file path=customXml/itemProps1.xml><?xml version="1.0" encoding="utf-8"?>
-<ds:datastoreItem xmlns:ds="http://schemas.openxmlformats.org/officeDocument/2006/customXml" ds:itemID="{B0CA13EC-1D3C-4D6F-8D1C-E8A452CFC79A}">
+<ds:datastoreItem xmlns:ds="http://schemas.openxmlformats.org/officeDocument/2006/customXml" ds:itemID="{7025FDD9-4C58-4084-9F89-0E6ADD6FFF55}">
   <ds:schemaRefs>
-    <ds:schemaRef ds:uri="http://schemas.microsoft.com/sharepoint/v3/contenttype/forms"/>
+    <ds:schemaRef ds:uri="27aa9422-7f1f-4c84-9cdf-302b1a67e513"/>
+    <ds:schemaRef ds:uri="http://schemas.microsoft.com/office/2006/documentManagement/types"/>
+    <ds:schemaRef ds:uri="http://schemas.microsoft.com/office/2006/metadata/properties"/>
+    <ds:schemaRef ds:uri="http://purl.org/dc/elements/1.1/"/>
+    <ds:schemaRef ds:uri="230e9df3-be65-4c73-a93b-d1236ebd677e"/>
+    <ds:schemaRef ds:uri="http://purl.org/dc/terms/"/>
+    <ds:schemaRef ds:uri="http://schemas.openxmlformats.org/package/2006/metadata/core-properties"/>
+    <ds:schemaRef ds:uri="http://purl.org/dc/dcmitype/"/>
+    <ds:schemaRef ds:uri="http://schemas.microsoft.com/office/infopath/2007/PartnerControls"/>
+    <ds:schemaRef ds:uri="http://schemas.microsoft.com/sharepoint/v3"/>
+    <ds:schemaRef ds:uri="http://www.w3.org/XML/1998/namespace"/>
   </ds:schemaRefs>
 </ds:datastoreItem>
 </file>
@@ -6126,19 +6956,9 @@
 </file>
 
 <file path=customXml/itemProps3.xml><?xml version="1.0" encoding="utf-8"?>
-<ds:datastoreItem xmlns:ds="http://schemas.openxmlformats.org/officeDocument/2006/customXml" ds:itemID="{7025FDD9-4C58-4084-9F89-0E6ADD6FFF55}">
+<ds:datastoreItem xmlns:ds="http://schemas.openxmlformats.org/officeDocument/2006/customXml" ds:itemID="{B0CA13EC-1D3C-4D6F-8D1C-E8A452CFC79A}">
   <ds:schemaRefs>
-    <ds:schemaRef ds:uri="27aa9422-7f1f-4c84-9cdf-302b1a67e513"/>
-    <ds:schemaRef ds:uri="http://schemas.microsoft.com/office/2006/documentManagement/types"/>
-    <ds:schemaRef ds:uri="http://schemas.microsoft.com/office/2006/metadata/properties"/>
-    <ds:schemaRef ds:uri="http://purl.org/dc/elements/1.1/"/>
-    <ds:schemaRef ds:uri="230e9df3-be65-4c73-a93b-d1236ebd677e"/>
-    <ds:schemaRef ds:uri="http://purl.org/dc/terms/"/>
-    <ds:schemaRef ds:uri="http://schemas.openxmlformats.org/package/2006/metadata/core-properties"/>
-    <ds:schemaRef ds:uri="http://purl.org/dc/dcmitype/"/>
-    <ds:schemaRef ds:uri="http://schemas.microsoft.com/office/infopath/2007/PartnerControls"/>
-    <ds:schemaRef ds:uri="http://schemas.microsoft.com/sharepoint/v3"/>
-    <ds:schemaRef ds:uri="http://www.w3.org/XML/1998/namespace"/>
+    <ds:schemaRef ds:uri="http://schemas.microsoft.com/sharepoint/v3/contenttype/forms"/>
   </ds:schemaRefs>
 </ds:datastoreItem>
 </file>
</xml_diff>

<commit_message>
Updates to notes and decks
</commit_message>
<xml_diff>
--- a/Slides/Module 4 - Validation and Error Handling.pptx
+++ b/Slides/Module 4 - Validation and Error Handling.pptx
@@ -222,7 +222,7 @@
           <a:p>
             <a:fld id="{312E7B4A-039C-48A2-9B2C-AF16AA3873D8}" type="datetimeFigureOut">
               <a:rPr lang="en-US" smtClean="0"/>
-              <a:t>1/28/2015</a:t>
+              <a:t>2/2/2015</a:t>
             </a:fld>
             <a:endParaRPr lang="en-US"/>
           </a:p>
@@ -387,7 +387,7 @@
           <a:p>
             <a:fld id="{DA005A0C-54D9-45AA-87D4-C551D08DFCE1}" type="datetimeFigureOut">
               <a:rPr lang="en-US" smtClean="0"/>
-              <a:t>1/28/2015</a:t>
+              <a:t>2/2/2015</a:t>
             </a:fld>
             <a:endParaRPr lang="en-US"/>
           </a:p>
@@ -978,10 +978,30 @@
           <a:lstStyle/>
           <a:p>
             <a:r>
-              <a:rPr lang="en-US" smtClean="0"/>
-              <a:t>04aModelValidation</a:t>
-            </a:r>
-            <a:endParaRPr lang="en-US"/>
+              <a:rPr lang="en-US" dirty="0" smtClean="0"/>
+              <a:t>/</a:t>
+            </a:r>
+            <a:r>
+              <a:rPr lang="en-US" dirty="0" err="1" smtClean="0"/>
+              <a:t>api</a:t>
+            </a:r>
+            <a:r>
+              <a:rPr lang="en-US" dirty="0" smtClean="0"/>
+              <a:t>/</a:t>
+            </a:r>
+            <a:r>
+              <a:rPr lang="en-US" dirty="0" err="1" smtClean="0"/>
+              <a:t>helpers?test</a:t>
+            </a:r>
+            <a:r>
+              <a:rPr lang="en-US" dirty="0" smtClean="0"/>
+              <a:t>=1 (for</a:t>
+            </a:r>
+            <a:r>
+              <a:rPr lang="en-US" baseline="0" dirty="0" smtClean="0"/>
+              <a:t> 3 show headers/location)</a:t>
+            </a:r>
+            <a:endParaRPr lang="en-US" dirty="0"/>
           </a:p>
         </p:txBody>
       </p:sp>
@@ -1002,7 +1022,7 @@
           <a:p>
             <a:fld id="{4CFD207A-07DF-40AD-A916-9872E089CE7A}" type="slidenum">
               <a:rPr lang="en-US" smtClean="0"/>
-              <a:t>11</a:t>
+              <a:t>9</a:t>
             </a:fld>
             <a:endParaRPr lang="en-US"/>
           </a:p>
@@ -1011,7 +1031,7 @@
     </p:spTree>
     <p:extLst>
       <p:ext uri="{BB962C8B-B14F-4D97-AF65-F5344CB8AC3E}">
-        <p14:creationId xmlns:p14="http://schemas.microsoft.com/office/powerpoint/2010/main" val="3649459500"/>
+        <p14:creationId xmlns:p14="http://schemas.microsoft.com/office/powerpoint/2010/main" val="208543177"/>
       </p:ext>
     </p:extLst>
   </p:cSld>
@@ -1090,6 +1110,94 @@
           <a:p>
             <a:fld id="{4CFD207A-07DF-40AD-A916-9872E089CE7A}" type="slidenum">
               <a:rPr lang="en-US" smtClean="0"/>
+              <a:t>11</a:t>
+            </a:fld>
+            <a:endParaRPr lang="en-US"/>
+          </a:p>
+        </p:txBody>
+      </p:sp>
+    </p:spTree>
+    <p:extLst>
+      <p:ext uri="{BB962C8B-B14F-4D97-AF65-F5344CB8AC3E}">
+        <p14:creationId xmlns:p14="http://schemas.microsoft.com/office/powerpoint/2010/main" val="3649459500"/>
+      </p:ext>
+    </p:extLst>
+  </p:cSld>
+  <p:clrMapOvr>
+    <a:masterClrMapping/>
+  </p:clrMapOvr>
+</p:notes>
+</file>
+
+<file path=ppt/notesSlides/notesSlide6.xml><?xml version="1.0" encoding="utf-8"?>
+<p:notes xmlns:a="http://schemas.openxmlformats.org/drawingml/2006/main" xmlns:r="http://schemas.openxmlformats.org/officeDocument/2006/relationships" xmlns:p="http://schemas.openxmlformats.org/presentationml/2006/main">
+  <p:cSld>
+    <p:spTree>
+      <p:nvGrpSpPr>
+        <p:cNvPr id="1" name=""/>
+        <p:cNvGrpSpPr/>
+        <p:nvPr/>
+      </p:nvGrpSpPr>
+      <p:grpSpPr>
+        <a:xfrm>
+          <a:off x="0" y="0"/>
+          <a:ext cx="0" cy="0"/>
+          <a:chOff x="0" y="0"/>
+          <a:chExt cx="0" cy="0"/>
+        </a:xfrm>
+      </p:grpSpPr>
+      <p:sp>
+        <p:nvSpPr>
+          <p:cNvPr id="2" name="Slide Image Placeholder 1"/>
+          <p:cNvSpPr>
+            <a:spLocks noGrp="1" noRot="1" noChangeAspect="1"/>
+          </p:cNvSpPr>
+          <p:nvPr>
+            <p:ph type="sldImg"/>
+          </p:nvPr>
+        </p:nvSpPr>
+        <p:spPr/>
+      </p:sp>
+      <p:sp>
+        <p:nvSpPr>
+          <p:cNvPr id="3" name="Notes Placeholder 2"/>
+          <p:cNvSpPr>
+            <a:spLocks noGrp="1"/>
+          </p:cNvSpPr>
+          <p:nvPr>
+            <p:ph type="body" idx="1"/>
+          </p:nvPr>
+        </p:nvSpPr>
+        <p:spPr/>
+        <p:txBody>
+          <a:bodyPr/>
+          <a:lstStyle/>
+          <a:p>
+            <a:r>
+              <a:rPr lang="en-US" smtClean="0"/>
+              <a:t>04bExceptionFilter</a:t>
+            </a:r>
+            <a:endParaRPr lang="en-US" dirty="0"/>
+          </a:p>
+        </p:txBody>
+      </p:sp>
+      <p:sp>
+        <p:nvSpPr>
+          <p:cNvPr id="4" name="Slide Number Placeholder 3"/>
+          <p:cNvSpPr>
+            <a:spLocks noGrp="1"/>
+          </p:cNvSpPr>
+          <p:nvPr>
+            <p:ph type="sldNum" sz="quarter" idx="10"/>
+          </p:nvPr>
+        </p:nvSpPr>
+        <p:spPr/>
+        <p:txBody>
+          <a:bodyPr/>
+          <a:lstStyle/>
+          <a:p>
+            <a:fld id="{4CFD207A-07DF-40AD-A916-9872E089CE7A}" type="slidenum">
+              <a:rPr lang="en-US" smtClean="0"/>
               <a:t>14</a:t>
             </a:fld>
             <a:endParaRPr lang="en-US"/>
@@ -1109,7 +1217,7 @@
 </p:notes>
 </file>
 
-<file path=ppt/notesSlides/notesSlide6.xml><?xml version="1.0" encoding="utf-8"?>
+<file path=ppt/notesSlides/notesSlide7.xml><?xml version="1.0" encoding="utf-8"?>
 <p:notes xmlns:a="http://schemas.openxmlformats.org/drawingml/2006/main" xmlns:r="http://schemas.openxmlformats.org/officeDocument/2006/relationships" xmlns:p="http://schemas.openxmlformats.org/presentationml/2006/main">
   <p:cSld>
     <p:spTree>
@@ -6720,12 +6828,16 @@
 </file>
 
 <file path=customXml/item1.xml><?xml version="1.0" encoding="utf-8"?>
-<?mso-contentType ?>
-<FormTemplates xmlns="http://schemas.microsoft.com/sharepoint/v3/contenttype/forms">
-  <Display>DocumentLibraryForm</Display>
-  <Edit>DocumentLibraryForm</Edit>
-  <New>DocumentLibraryForm</New>
-</FormTemplates>
+<p:properties xmlns:p="http://schemas.microsoft.com/office/2006/metadata/properties" xmlns:xsi="http://www.w3.org/2001/XMLSchema-instance" xmlns:pc="http://schemas.microsoft.com/office/infopath/2007/PartnerControls">
+  <documentManagement>
+    <TaxCatchAll xmlns="230e9df3-be65-4c73-a93b-d1236ebd677e"/>
+    <PublishingExpirationDate xmlns="http://schemas.microsoft.com/sharepoint/v3" xsi:nil="true"/>
+    <PublishingStartDate xmlns="http://schemas.microsoft.com/sharepoint/v3" xsi:nil="true"/>
+    <TaxKeywordTaxHTField xmlns="230e9df3-be65-4c73-a93b-d1236ebd677e">
+      <Terms xmlns="http://schemas.microsoft.com/office/infopath/2007/PartnerControls"/>
+    </TaxKeywordTaxHTField>
+  </documentManagement>
+</p:properties>
 </file>
 
 <file path=customXml/item2.xml><?xml version="1.0" encoding="utf-8"?>
@@ -6911,22 +7023,28 @@
 </file>
 
 <file path=customXml/item3.xml><?xml version="1.0" encoding="utf-8"?>
-<p:properties xmlns:p="http://schemas.microsoft.com/office/2006/metadata/properties" xmlns:xsi="http://www.w3.org/2001/XMLSchema-instance" xmlns:pc="http://schemas.microsoft.com/office/infopath/2007/PartnerControls">
-  <documentManagement>
-    <TaxCatchAll xmlns="230e9df3-be65-4c73-a93b-d1236ebd677e"/>
-    <PublishingExpirationDate xmlns="http://schemas.microsoft.com/sharepoint/v3" xsi:nil="true"/>
-    <PublishingStartDate xmlns="http://schemas.microsoft.com/sharepoint/v3" xsi:nil="true"/>
-    <TaxKeywordTaxHTField xmlns="230e9df3-be65-4c73-a93b-d1236ebd677e">
-      <Terms xmlns="http://schemas.microsoft.com/office/infopath/2007/PartnerControls"/>
-    </TaxKeywordTaxHTField>
-  </documentManagement>
-</p:properties>
+<?mso-contentType ?>
+<FormTemplates xmlns="http://schemas.microsoft.com/sharepoint/v3/contenttype/forms">
+  <Display>DocumentLibraryForm</Display>
+  <Edit>DocumentLibraryForm</Edit>
+  <New>DocumentLibraryForm</New>
+</FormTemplates>
 </file>
 
 <file path=customXml/itemProps1.xml><?xml version="1.0" encoding="utf-8"?>
-<ds:datastoreItem xmlns:ds="http://schemas.openxmlformats.org/officeDocument/2006/customXml" ds:itemID="{B0CA13EC-1D3C-4D6F-8D1C-E8A452CFC79A}">
+<ds:datastoreItem xmlns:ds="http://schemas.openxmlformats.org/officeDocument/2006/customXml" ds:itemID="{7025FDD9-4C58-4084-9F89-0E6ADD6FFF55}">
   <ds:schemaRefs>
-    <ds:schemaRef ds:uri="http://schemas.microsoft.com/sharepoint/v3/contenttype/forms"/>
+    <ds:schemaRef ds:uri="27aa9422-7f1f-4c84-9cdf-302b1a67e513"/>
+    <ds:schemaRef ds:uri="http://schemas.microsoft.com/office/2006/documentManagement/types"/>
+    <ds:schemaRef ds:uri="http://schemas.microsoft.com/office/2006/metadata/properties"/>
+    <ds:schemaRef ds:uri="http://purl.org/dc/elements/1.1/"/>
+    <ds:schemaRef ds:uri="230e9df3-be65-4c73-a93b-d1236ebd677e"/>
+    <ds:schemaRef ds:uri="http://purl.org/dc/terms/"/>
+    <ds:schemaRef ds:uri="http://schemas.openxmlformats.org/package/2006/metadata/core-properties"/>
+    <ds:schemaRef ds:uri="http://purl.org/dc/dcmitype/"/>
+    <ds:schemaRef ds:uri="http://schemas.microsoft.com/office/infopath/2007/PartnerControls"/>
+    <ds:schemaRef ds:uri="http://schemas.microsoft.com/sharepoint/v3"/>
+    <ds:schemaRef ds:uri="http://www.w3.org/XML/1998/namespace"/>
   </ds:schemaRefs>
 </ds:datastoreItem>
 </file>
@@ -6952,19 +7070,9 @@
 </file>
 
 <file path=customXml/itemProps3.xml><?xml version="1.0" encoding="utf-8"?>
-<ds:datastoreItem xmlns:ds="http://schemas.openxmlformats.org/officeDocument/2006/customXml" ds:itemID="{7025FDD9-4C58-4084-9F89-0E6ADD6FFF55}">
+<ds:datastoreItem xmlns:ds="http://schemas.openxmlformats.org/officeDocument/2006/customXml" ds:itemID="{B0CA13EC-1D3C-4D6F-8D1C-E8A452CFC79A}">
   <ds:schemaRefs>
-    <ds:schemaRef ds:uri="27aa9422-7f1f-4c84-9cdf-302b1a67e513"/>
-    <ds:schemaRef ds:uri="http://schemas.microsoft.com/office/2006/documentManagement/types"/>
-    <ds:schemaRef ds:uri="http://schemas.microsoft.com/office/2006/metadata/properties"/>
-    <ds:schemaRef ds:uri="http://purl.org/dc/elements/1.1/"/>
-    <ds:schemaRef ds:uri="230e9df3-be65-4c73-a93b-d1236ebd677e"/>
-    <ds:schemaRef ds:uri="http://purl.org/dc/terms/"/>
-    <ds:schemaRef ds:uri="http://schemas.openxmlformats.org/package/2006/metadata/core-properties"/>
-    <ds:schemaRef ds:uri="http://purl.org/dc/dcmitype/"/>
-    <ds:schemaRef ds:uri="http://schemas.microsoft.com/office/infopath/2007/PartnerControls"/>
-    <ds:schemaRef ds:uri="http://schemas.microsoft.com/sharepoint/v3"/>
-    <ds:schemaRef ds:uri="http://www.w3.org/XML/1998/namespace"/>
+    <ds:schemaRef ds:uri="http://schemas.microsoft.com/sharepoint/v3/contenttype/forms"/>
   </ds:schemaRefs>
 </ds:datastoreItem>
 </file>
</xml_diff>